<commit_message>
Chap04: Picture done to include thermalized QD (antiferro and temperature). Caption done. Beginning of antiferro discussion.
</commit_message>
<xml_diff>
--- a/04-CrMagOpt/Pictures/Antiferro-CrMn.pptx
+++ b/04-CrMagOpt/Pictures/Antiferro-CrMn.pptx
@@ -288,7 +288,7 @@
           <a:p>
             <a:fld id="{DDDBA8FD-0BE8-4236-A661-54A1E3FD23D6}" type="datetimeFigureOut">
               <a:rPr lang="fr-FR" smtClean="0"/>
-              <a:t>23/06/2017</a:t>
+              <a:t>26/06/2017</a:t>
             </a:fld>
             <a:endParaRPr lang="fr-FR"/>
           </a:p>
@@ -458,7 +458,7 @@
           <a:p>
             <a:fld id="{DDDBA8FD-0BE8-4236-A661-54A1E3FD23D6}" type="datetimeFigureOut">
               <a:rPr lang="fr-FR" smtClean="0"/>
-              <a:t>23/06/2017</a:t>
+              <a:t>26/06/2017</a:t>
             </a:fld>
             <a:endParaRPr lang="fr-FR"/>
           </a:p>
@@ -638,7 +638,7 @@
           <a:p>
             <a:fld id="{DDDBA8FD-0BE8-4236-A661-54A1E3FD23D6}" type="datetimeFigureOut">
               <a:rPr lang="fr-FR" smtClean="0"/>
-              <a:t>23/06/2017</a:t>
+              <a:t>26/06/2017</a:t>
             </a:fld>
             <a:endParaRPr lang="fr-FR"/>
           </a:p>
@@ -808,7 +808,7 @@
           <a:p>
             <a:fld id="{DDDBA8FD-0BE8-4236-A661-54A1E3FD23D6}" type="datetimeFigureOut">
               <a:rPr lang="fr-FR" smtClean="0"/>
-              <a:t>23/06/2017</a:t>
+              <a:t>26/06/2017</a:t>
             </a:fld>
             <a:endParaRPr lang="fr-FR"/>
           </a:p>
@@ -1054,7 +1054,7 @@
           <a:p>
             <a:fld id="{DDDBA8FD-0BE8-4236-A661-54A1E3FD23D6}" type="datetimeFigureOut">
               <a:rPr lang="fr-FR" smtClean="0"/>
-              <a:t>23/06/2017</a:t>
+              <a:t>26/06/2017</a:t>
             </a:fld>
             <a:endParaRPr lang="fr-FR"/>
           </a:p>
@@ -1342,7 +1342,7 @@
           <a:p>
             <a:fld id="{DDDBA8FD-0BE8-4236-A661-54A1E3FD23D6}" type="datetimeFigureOut">
               <a:rPr lang="fr-FR" smtClean="0"/>
-              <a:t>23/06/2017</a:t>
+              <a:t>26/06/2017</a:t>
             </a:fld>
             <a:endParaRPr lang="fr-FR"/>
           </a:p>
@@ -1769,7 +1769,7 @@
           <a:p>
             <a:fld id="{DDDBA8FD-0BE8-4236-A661-54A1E3FD23D6}" type="datetimeFigureOut">
               <a:rPr lang="fr-FR" smtClean="0"/>
-              <a:t>23/06/2017</a:t>
+              <a:t>26/06/2017</a:t>
             </a:fld>
             <a:endParaRPr lang="fr-FR"/>
           </a:p>
@@ -1887,7 +1887,7 @@
           <a:p>
             <a:fld id="{DDDBA8FD-0BE8-4236-A661-54A1E3FD23D6}" type="datetimeFigureOut">
               <a:rPr lang="fr-FR" smtClean="0"/>
-              <a:t>23/06/2017</a:t>
+              <a:t>26/06/2017</a:t>
             </a:fld>
             <a:endParaRPr lang="fr-FR"/>
           </a:p>
@@ -1982,7 +1982,7 @@
           <a:p>
             <a:fld id="{DDDBA8FD-0BE8-4236-A661-54A1E3FD23D6}" type="datetimeFigureOut">
               <a:rPr lang="fr-FR" smtClean="0"/>
-              <a:t>23/06/2017</a:t>
+              <a:t>26/06/2017</a:t>
             </a:fld>
             <a:endParaRPr lang="fr-FR"/>
           </a:p>
@@ -2259,7 +2259,7 @@
           <a:p>
             <a:fld id="{DDDBA8FD-0BE8-4236-A661-54A1E3FD23D6}" type="datetimeFigureOut">
               <a:rPr lang="fr-FR" smtClean="0"/>
-              <a:t>23/06/2017</a:t>
+              <a:t>26/06/2017</a:t>
             </a:fld>
             <a:endParaRPr lang="fr-FR"/>
           </a:p>
@@ -2512,7 +2512,7 @@
           <a:p>
             <a:fld id="{DDDBA8FD-0BE8-4236-A661-54A1E3FD23D6}" type="datetimeFigureOut">
               <a:rPr lang="fr-FR" smtClean="0"/>
-              <a:t>23/06/2017</a:t>
+              <a:t>26/06/2017</a:t>
             </a:fld>
             <a:endParaRPr lang="fr-FR"/>
           </a:p>
@@ -2725,7 +2725,7 @@
           <a:p>
             <a:fld id="{DDDBA8FD-0BE8-4236-A661-54A1E3FD23D6}" type="datetimeFigureOut">
               <a:rPr lang="fr-FR" smtClean="0"/>
-              <a:t>23/06/2017</a:t>
+              <a:t>26/06/2017</a:t>
             </a:fld>
             <a:endParaRPr lang="fr-FR"/>
           </a:p>
@@ -3265,171 +3265,156 @@
           </p:txBody>
         </p:sp>
       </p:grpSp>
-      <p:grpSp>
-        <p:nvGrpSpPr>
-          <p:cNvPr id="1054" name="Groupe 1053"/>
-          <p:cNvGrpSpPr/>
+      <p:pic>
+        <p:nvPicPr>
+          <p:cNvPr id="1026" name="Picture 2"/>
+          <p:cNvPicPr>
+            <a:picLocks noChangeAspect="1" noChangeArrowheads="1"/>
+          </p:cNvPicPr>
           <p:nvPr/>
-        </p:nvGrpSpPr>
-        <p:grpSpPr>
-          <a:xfrm>
-            <a:off x="5580112" y="-126000"/>
-            <a:ext cx="4187262" cy="7077600"/>
-            <a:chOff x="5580112" y="-126000"/>
-            <a:chExt cx="4187262" cy="7077600"/>
-          </a:xfrm>
-        </p:grpSpPr>
-        <p:pic>
-          <p:nvPicPr>
-            <p:cNvPr id="101" name="Picture 22"/>
-            <p:cNvPicPr>
-              <a:picLocks noChangeAspect="1" noChangeArrowheads="1"/>
-            </p:cNvPicPr>
-            <p:nvPr/>
-          </p:nvPicPr>
-          <p:blipFill>
-            <a:blip r:embed="rId3">
-              <a:extLst>
-                <a:ext uri="{28A0092B-C50C-407E-A947-70E740481C1C}">
-                  <a14:useLocalDpi xmlns:a14="http://schemas.microsoft.com/office/drawing/2010/main" val="0"/>
-                </a:ext>
-              </a:extLst>
-            </a:blip>
-            <a:srcRect/>
-            <a:stretch>
-              <a:fillRect/>
-            </a:stretch>
-          </p:blipFill>
-          <p:spPr bwMode="auto">
-            <a:xfrm>
-              <a:off x="5580112" y="-126000"/>
-              <a:ext cx="4187262" cy="7077600"/>
-            </a:xfrm>
-            <a:prstGeom prst="rect">
-              <a:avLst/>
-            </a:prstGeom>
-            <a:noFill/>
-            <a:ln>
-              <a:noFill/>
-            </a:ln>
+        </p:nvPicPr>
+        <p:blipFill>
+          <a:blip r:embed="rId3">
             <a:extLst>
-              <a:ext uri="{909E8E84-426E-40DD-AFC4-6F175D3DCCD1}">
-                <a14:hiddenFill xmlns:a14="http://schemas.microsoft.com/office/drawing/2010/main">
-                  <a:solidFill>
-                    <a:schemeClr val="accent1"/>
-                  </a:solidFill>
-                </a14:hiddenFill>
-              </a:ext>
-              <a:ext uri="{91240B29-F687-4F45-9708-019B960494DF}">
-                <a14:hiddenLine xmlns:a14="http://schemas.microsoft.com/office/drawing/2010/main" w="9525">
-                  <a:solidFill>
-                    <a:schemeClr val="tx1"/>
-                  </a:solidFill>
-                  <a:miter lim="800000"/>
-                  <a:headEnd/>
-                  <a:tailEnd/>
-                </a14:hiddenLine>
+              <a:ext uri="{28A0092B-C50C-407E-A947-70E740481C1C}">
+                <a14:useLocalDpi xmlns:a14="http://schemas.microsoft.com/office/drawing/2010/main" val="0"/>
               </a:ext>
             </a:extLst>
-          </p:spPr>
-        </p:pic>
-        <p:sp>
-          <p:nvSpPr>
-            <p:cNvPr id="110" name="Rectangle 109"/>
-            <p:cNvSpPr/>
-            <p:nvPr/>
-          </p:nvSpPr>
-          <p:spPr>
-            <a:xfrm>
-              <a:off x="5994000" y="4554364"/>
-              <a:ext cx="72008" cy="144016"/>
-            </a:xfrm>
-            <a:prstGeom prst="rect">
-              <a:avLst/>
-            </a:prstGeom>
+          </a:blip>
+          <a:srcRect/>
+          <a:stretch>
+            <a:fillRect/>
+          </a:stretch>
+        </p:blipFill>
+        <p:spPr bwMode="auto">
+          <a:xfrm>
+            <a:off x="5580000" y="-126000"/>
+            <a:ext cx="4187263" cy="7077600"/>
+          </a:xfrm>
+          <a:prstGeom prst="rect">
+            <a:avLst/>
+          </a:prstGeom>
+          <a:noFill/>
+          <a:ln>
+            <a:noFill/>
+          </a:ln>
+          <a:extLst>
+            <a:ext uri="{909E8E84-426E-40DD-AFC4-6F175D3DCCD1}">
+              <a14:hiddenFill xmlns:a14="http://schemas.microsoft.com/office/drawing/2010/main">
+                <a:solidFill>
+                  <a:schemeClr val="accent1"/>
+                </a:solidFill>
+              </a14:hiddenFill>
+            </a:ext>
+            <a:ext uri="{91240B29-F687-4F45-9708-019B960494DF}">
+              <a14:hiddenLine xmlns:a14="http://schemas.microsoft.com/office/drawing/2010/main" w="9525">
+                <a:solidFill>
+                  <a:schemeClr val="tx1"/>
+                </a:solidFill>
+                <a:miter lim="800000"/>
+                <a:headEnd/>
+                <a:tailEnd/>
+              </a14:hiddenLine>
+            </a:ext>
+          </a:extLst>
+        </p:spPr>
+      </p:pic>
+      <p:sp>
+        <p:nvSpPr>
+          <p:cNvPr id="110" name="Rectangle 109"/>
+          <p:cNvSpPr/>
+          <p:nvPr/>
+        </p:nvSpPr>
+        <p:spPr>
+          <a:xfrm>
+            <a:off x="5994000" y="4554364"/>
+            <a:ext cx="72008" cy="144016"/>
+          </a:xfrm>
+          <a:prstGeom prst="rect">
+            <a:avLst/>
+          </a:prstGeom>
+          <a:solidFill>
+            <a:schemeClr val="bg1"/>
+          </a:solidFill>
+          <a:ln>
             <a:solidFill>
               <a:schemeClr val="bg1"/>
             </a:solidFill>
-            <a:ln>
-              <a:solidFill>
-                <a:schemeClr val="bg1"/>
-              </a:solidFill>
-            </a:ln>
-          </p:spPr>
-          <p:style>
-            <a:lnRef idx="2">
-              <a:schemeClr val="accent1">
-                <a:shade val="50000"/>
-              </a:schemeClr>
-            </a:lnRef>
-            <a:fillRef idx="1">
-              <a:schemeClr val="accent1"/>
-            </a:fillRef>
-            <a:effectRef idx="0">
-              <a:schemeClr val="accent1"/>
-            </a:effectRef>
-            <a:fontRef idx="minor">
-              <a:schemeClr val="lt1"/>
-            </a:fontRef>
-          </p:style>
-          <p:txBody>
-            <a:bodyPr rtlCol="0" anchor="ctr"/>
-            <a:lstStyle/>
-            <a:p>
-              <a:pPr algn="ctr"/>
-              <a:endParaRPr lang="fr-FR"/>
-            </a:p>
-          </p:txBody>
-        </p:sp>
-        <p:sp>
-          <p:nvSpPr>
-            <p:cNvPr id="111" name="Rectangle 110"/>
-            <p:cNvSpPr/>
-            <p:nvPr/>
-          </p:nvSpPr>
-          <p:spPr>
-            <a:xfrm>
-              <a:off x="5921992" y="5994524"/>
-              <a:ext cx="72008" cy="144016"/>
-            </a:xfrm>
-            <a:prstGeom prst="rect">
-              <a:avLst/>
-            </a:prstGeom>
+          </a:ln>
+        </p:spPr>
+        <p:style>
+          <a:lnRef idx="2">
+            <a:schemeClr val="accent1">
+              <a:shade val="50000"/>
+            </a:schemeClr>
+          </a:lnRef>
+          <a:fillRef idx="1">
+            <a:schemeClr val="accent1"/>
+          </a:fillRef>
+          <a:effectRef idx="0">
+            <a:schemeClr val="accent1"/>
+          </a:effectRef>
+          <a:fontRef idx="minor">
+            <a:schemeClr val="lt1"/>
+          </a:fontRef>
+        </p:style>
+        <p:txBody>
+          <a:bodyPr rtlCol="0" anchor="ctr"/>
+          <a:lstStyle/>
+          <a:p>
+            <a:pPr algn="ctr"/>
+            <a:endParaRPr lang="fr-FR"/>
+          </a:p>
+        </p:txBody>
+      </p:sp>
+      <p:sp>
+        <p:nvSpPr>
+          <p:cNvPr id="111" name="Rectangle 110"/>
+          <p:cNvSpPr/>
+          <p:nvPr/>
+        </p:nvSpPr>
+        <p:spPr>
+          <a:xfrm>
+            <a:off x="5921992" y="5994524"/>
+            <a:ext cx="72008" cy="144016"/>
+          </a:xfrm>
+          <a:prstGeom prst="rect">
+            <a:avLst/>
+          </a:prstGeom>
+          <a:solidFill>
+            <a:schemeClr val="bg1"/>
+          </a:solidFill>
+          <a:ln>
             <a:solidFill>
               <a:schemeClr val="bg1"/>
             </a:solidFill>
-            <a:ln>
-              <a:solidFill>
-                <a:schemeClr val="bg1"/>
-              </a:solidFill>
-            </a:ln>
-          </p:spPr>
-          <p:style>
-            <a:lnRef idx="2">
-              <a:schemeClr val="accent1">
-                <a:shade val="50000"/>
-              </a:schemeClr>
-            </a:lnRef>
-            <a:fillRef idx="1">
-              <a:schemeClr val="accent1"/>
-            </a:fillRef>
-            <a:effectRef idx="0">
-              <a:schemeClr val="accent1"/>
-            </a:effectRef>
-            <a:fontRef idx="minor">
-              <a:schemeClr val="lt1"/>
-            </a:fontRef>
-          </p:style>
-          <p:txBody>
-            <a:bodyPr rtlCol="0" anchor="ctr"/>
-            <a:lstStyle/>
-            <a:p>
-              <a:pPr algn="ctr"/>
-              <a:endParaRPr lang="fr-FR"/>
-            </a:p>
-          </p:txBody>
-        </p:sp>
-      </p:grpSp>
+          </a:ln>
+        </p:spPr>
+        <p:style>
+          <a:lnRef idx="2">
+            <a:schemeClr val="accent1">
+              <a:shade val="50000"/>
+            </a:schemeClr>
+          </a:lnRef>
+          <a:fillRef idx="1">
+            <a:schemeClr val="accent1"/>
+          </a:fillRef>
+          <a:effectRef idx="0">
+            <a:schemeClr val="accent1"/>
+          </a:effectRef>
+          <a:fontRef idx="minor">
+            <a:schemeClr val="lt1"/>
+          </a:fontRef>
+        </p:style>
+        <p:txBody>
+          <a:bodyPr rtlCol="0" anchor="ctr"/>
+          <a:lstStyle/>
+          <a:p>
+            <a:pPr algn="ctr"/>
+            <a:endParaRPr lang="fr-FR"/>
+          </a:p>
+        </p:txBody>
+      </p:sp>
       <p:pic>
         <p:nvPicPr>
           <p:cNvPr id="102" name="Picture 29"/>
@@ -3767,7 +3752,7 @@
         </p:nvSpPr>
         <p:spPr>
           <a:xfrm>
-            <a:off x="8931" y="-155773"/>
+            <a:off x="8931" y="-83765"/>
             <a:ext cx="423514" cy="461665"/>
           </a:xfrm>
           <a:prstGeom prst="rect">
@@ -3803,7 +3788,7 @@
         </p:nvSpPr>
         <p:spPr>
           <a:xfrm>
-            <a:off x="5625555" y="-155773"/>
+            <a:off x="5625555" y="-83765"/>
             <a:ext cx="441146" cy="461665"/>
           </a:xfrm>
           <a:prstGeom prst="rect">

</xml_diff>